<commit_message>
Small modifications to workflow due to new location for charts at `all_charts`
Small modifications to workflow due to new location for charts at `all_charts`
</commit_message>
<xml_diff>
--- a/evaluation_scripts/assets/FlowChart.pptx
+++ b/evaluation_scripts/assets/FlowChart.pptx
@@ -105,6 +105,11 @@
       </a:defRPr>
     </a:lvl9pPr>
   </p:defaultTextStyle>
+  <p:extLst>
+    <p:ext uri="{EFAFB233-063F-42B5-8137-9DF3F51BA10A}">
+      <p15:sldGuideLst xmlns:p15="http://schemas.microsoft.com/office/powerpoint/2012/main"/>
+    </p:ext>
+  </p:extLst>
 </p:presentation>
 </file>
 
@@ -263,7 +268,7 @@
           <a:p>
             <a:fld id="{F8F209F5-9793-9248-ADC8-A737B92496BB}" type="datetimeFigureOut">
               <a:rPr lang="en-US" smtClean="0"/>
-              <a:t>11/13/20</a:t>
+              <a:t>11/16/20</a:t>
             </a:fld>
             <a:endParaRPr lang="en-US"/>
           </a:p>
@@ -461,7 +466,7 @@
           <a:p>
             <a:fld id="{F8F209F5-9793-9248-ADC8-A737B92496BB}" type="datetimeFigureOut">
               <a:rPr lang="en-US" smtClean="0"/>
-              <a:t>11/13/20</a:t>
+              <a:t>11/16/20</a:t>
             </a:fld>
             <a:endParaRPr lang="en-US"/>
           </a:p>
@@ -669,7 +674,7 @@
           <a:p>
             <a:fld id="{F8F209F5-9793-9248-ADC8-A737B92496BB}" type="datetimeFigureOut">
               <a:rPr lang="en-US" smtClean="0"/>
-              <a:t>11/13/20</a:t>
+              <a:t>11/16/20</a:t>
             </a:fld>
             <a:endParaRPr lang="en-US"/>
           </a:p>
@@ -867,7 +872,7 @@
           <a:p>
             <a:fld id="{F8F209F5-9793-9248-ADC8-A737B92496BB}" type="datetimeFigureOut">
               <a:rPr lang="en-US" smtClean="0"/>
-              <a:t>11/13/20</a:t>
+              <a:t>11/16/20</a:t>
             </a:fld>
             <a:endParaRPr lang="en-US"/>
           </a:p>
@@ -1142,7 +1147,7 @@
           <a:p>
             <a:fld id="{F8F209F5-9793-9248-ADC8-A737B92496BB}" type="datetimeFigureOut">
               <a:rPr lang="en-US" smtClean="0"/>
-              <a:t>11/13/20</a:t>
+              <a:t>11/16/20</a:t>
             </a:fld>
             <a:endParaRPr lang="en-US"/>
           </a:p>
@@ -1407,7 +1412,7 @@
           <a:p>
             <a:fld id="{F8F209F5-9793-9248-ADC8-A737B92496BB}" type="datetimeFigureOut">
               <a:rPr lang="en-US" smtClean="0"/>
-              <a:t>11/13/20</a:t>
+              <a:t>11/16/20</a:t>
             </a:fld>
             <a:endParaRPr lang="en-US"/>
           </a:p>
@@ -1819,7 +1824,7 @@
           <a:p>
             <a:fld id="{F8F209F5-9793-9248-ADC8-A737B92496BB}" type="datetimeFigureOut">
               <a:rPr lang="en-US" smtClean="0"/>
-              <a:t>11/13/20</a:t>
+              <a:t>11/16/20</a:t>
             </a:fld>
             <a:endParaRPr lang="en-US"/>
           </a:p>
@@ -1960,7 +1965,7 @@
           <a:p>
             <a:fld id="{F8F209F5-9793-9248-ADC8-A737B92496BB}" type="datetimeFigureOut">
               <a:rPr lang="en-US" smtClean="0"/>
-              <a:t>11/13/20</a:t>
+              <a:t>11/16/20</a:t>
             </a:fld>
             <a:endParaRPr lang="en-US"/>
           </a:p>
@@ -2073,7 +2078,7 @@
           <a:p>
             <a:fld id="{F8F209F5-9793-9248-ADC8-A737B92496BB}" type="datetimeFigureOut">
               <a:rPr lang="en-US" smtClean="0"/>
-              <a:t>11/13/20</a:t>
+              <a:t>11/16/20</a:t>
             </a:fld>
             <a:endParaRPr lang="en-US"/>
           </a:p>
@@ -2384,7 +2389,7 @@
           <a:p>
             <a:fld id="{F8F209F5-9793-9248-ADC8-A737B92496BB}" type="datetimeFigureOut">
               <a:rPr lang="en-US" smtClean="0"/>
-              <a:t>11/13/20</a:t>
+              <a:t>11/16/20</a:t>
             </a:fld>
             <a:endParaRPr lang="en-US"/>
           </a:p>
@@ -2672,7 +2677,7 @@
           <a:p>
             <a:fld id="{F8F209F5-9793-9248-ADC8-A737B92496BB}" type="datetimeFigureOut">
               <a:rPr lang="en-US" smtClean="0"/>
-              <a:t>11/13/20</a:t>
+              <a:t>11/16/20</a:t>
             </a:fld>
             <a:endParaRPr lang="en-US"/>
           </a:p>
@@ -2913,7 +2918,7 @@
           <a:p>
             <a:fld id="{F8F209F5-9793-9248-ADC8-A737B92496BB}" type="datetimeFigureOut">
               <a:rPr lang="en-US" smtClean="0"/>
-              <a:t>11/13/20</a:t>
+              <a:t>11/16/20</a:t>
             </a:fld>
             <a:endParaRPr lang="en-US"/>
           </a:p>
@@ -7114,15 +7119,7 @@
               </a:r>
               <a:r>
                 <a:rPr lang="en-US" sz="1200" dirty="0" err="1"/>
-                <a:t>forecast_results</a:t>
-              </a:r>
-              <a:r>
-                <a:rPr lang="en-US" sz="1200" dirty="0"/>
-                <a:t>/</a:t>
-              </a:r>
-              <a:r>
-                <a:rPr lang="en-US" sz="1200" dirty="0" err="1"/>
-                <a:t>output_figures</a:t>
+                <a:t>all_charts</a:t>
               </a:r>
               <a:r>
                 <a:rPr lang="en-US" sz="1200" dirty="0"/>
@@ -7195,20 +7192,13 @@
             </a:r>
             <a:r>
               <a:rPr lang="en-US" sz="1200" dirty="0" err="1"/>
-              <a:t>forecast_results</a:t>
-            </a:r>
-            <a:r>
-              <a:rPr lang="en-US" sz="1200" dirty="0"/>
-              <a:t>/</a:t>
-            </a:r>
-            <a:r>
-              <a:rPr lang="en-US" sz="1200" dirty="0" err="1"/>
-              <a:t>output_figures</a:t>
-            </a:r>
-            <a:r>
-              <a:rPr lang="en-US" sz="1200" dirty="0"/>
+              <a:t>all_charts</a:t>
+            </a:r>
+            <a:r>
+              <a:rPr lang="en-US" sz="1200"/>
               <a:t>/…]</a:t>
             </a:r>
+            <a:endParaRPr lang="en-US" sz="1200" dirty="0"/>
           </a:p>
         </p:txBody>
       </p:sp>

</xml_diff>